<commit_message>
fix issue in bs4Dash cheatsheet (sidebar part)
</commit_message>
<xml_diff>
--- a/bs4Dash.pptx
+++ b/bs4Dash.pptx
@@ -2077,7 +2077,7 @@
           </a:ln>
           <a:extLst>
             <a:ext uri="{C572A759-6A51-4108-AA02-DFA0A04FC94B}">
-              <ma14:wrappingTextBoxFlag xmlns:ma14="http://schemas.microsoft.com/office/mac/drawingml/2011/main" xmlns:a14="http://schemas.microsoft.com/office/drawing/2010/main" xmlns:m="http://schemas.openxmlformats.org/officeDocument/2006/math" xmlns="" val="1"/>
+              <ma14:wrappingTextBoxFlag xmlns="" xmlns:m="http://schemas.openxmlformats.org/officeDocument/2006/math" xmlns:a14="http://schemas.microsoft.com/office/drawing/2010/main" xmlns:ma14="http://schemas.microsoft.com/office/mac/drawingml/2011/main" val="1"/>
             </a:ext>
           </a:extLst>
         </p:spPr>
@@ -2116,7 +2116,7 @@
           </a:ln>
           <a:extLst>
             <a:ext uri="{C572A759-6A51-4108-AA02-DFA0A04FC94B}">
-              <ma14:wrappingTextBoxFlag xmlns:ma14="http://schemas.microsoft.com/office/mac/drawingml/2011/main" xmlns:a14="http://schemas.microsoft.com/office/drawing/2010/main" xmlns:m="http://schemas.openxmlformats.org/officeDocument/2006/math" xmlns="" val="1"/>
+              <ma14:wrappingTextBoxFlag xmlns="" xmlns:m="http://schemas.openxmlformats.org/officeDocument/2006/math" xmlns:a14="http://schemas.microsoft.com/office/drawing/2010/main" xmlns:ma14="http://schemas.microsoft.com/office/mac/drawingml/2011/main" val="1"/>
             </a:ext>
           </a:extLst>
         </p:spPr>
@@ -3933,7 +3933,7 @@
           </a:ln>
           <a:extLst>
             <a:ext uri="{C572A759-6A51-4108-AA02-DFA0A04FC94B}">
-              <ma14:wrappingTextBoxFlag xmlns:ma14="http://schemas.microsoft.com/office/mac/drawingml/2011/main" xmlns:a14="http://schemas.microsoft.com/office/drawing/2010/main" xmlns:m="http://schemas.openxmlformats.org/officeDocument/2006/math" xmlns="" val="1"/>
+              <ma14:wrappingTextBoxFlag xmlns="" xmlns:m="http://schemas.openxmlformats.org/officeDocument/2006/math" xmlns:a14="http://schemas.microsoft.com/office/drawing/2010/main" xmlns:ma14="http://schemas.microsoft.com/office/mac/drawingml/2011/main" val="1"/>
             </a:ext>
           </a:extLst>
         </p:spPr>
@@ -4071,7 +4071,7 @@
           </a:ln>
           <a:extLst>
             <a:ext uri="{C572A759-6A51-4108-AA02-DFA0A04FC94B}">
-              <ma14:wrappingTextBoxFlag xmlns:ma14="http://schemas.microsoft.com/office/mac/drawingml/2011/main" xmlns:a14="http://schemas.microsoft.com/office/drawing/2010/main" xmlns:m="http://schemas.openxmlformats.org/officeDocument/2006/math" xmlns="" val="1"/>
+              <ma14:wrappingTextBoxFlag xmlns="" xmlns:m="http://schemas.openxmlformats.org/officeDocument/2006/math" xmlns:a14="http://schemas.microsoft.com/office/drawing/2010/main" xmlns:ma14="http://schemas.microsoft.com/office/mac/drawingml/2011/main" val="1"/>
             </a:ext>
           </a:extLst>
         </p:spPr>
@@ -4253,7 +4253,7 @@
           </a:ln>
           <a:extLst>
             <a:ext uri="{C572A759-6A51-4108-AA02-DFA0A04FC94B}">
-              <ma14:wrappingTextBoxFlag xmlns:ma14="http://schemas.microsoft.com/office/mac/drawingml/2011/main" xmlns:a14="http://schemas.microsoft.com/office/drawing/2010/main" xmlns:m="http://schemas.openxmlformats.org/officeDocument/2006/math" xmlns="" val="1"/>
+              <ma14:wrappingTextBoxFlag xmlns="" xmlns:m="http://schemas.openxmlformats.org/officeDocument/2006/math" xmlns:a14="http://schemas.microsoft.com/office/drawing/2010/main" xmlns:ma14="http://schemas.microsoft.com/office/mac/drawingml/2011/main" val="1"/>
             </a:ext>
           </a:extLst>
         </p:spPr>
@@ -4333,7 +4333,7 @@
           </a:ln>
           <a:extLst>
             <a:ext uri="{C572A759-6A51-4108-AA02-DFA0A04FC94B}">
-              <ma14:wrappingTextBoxFlag xmlns:ma14="http://schemas.microsoft.com/office/mac/drawingml/2011/main" xmlns:a14="http://schemas.microsoft.com/office/drawing/2010/main" xmlns:m="http://schemas.openxmlformats.org/officeDocument/2006/math" xmlns="" val="1"/>
+              <ma14:wrappingTextBoxFlag xmlns="" xmlns:m="http://schemas.openxmlformats.org/officeDocument/2006/math" xmlns:a14="http://schemas.microsoft.com/office/drawing/2010/main" xmlns:ma14="http://schemas.microsoft.com/office/mac/drawingml/2011/main" val="1"/>
             </a:ext>
           </a:extLst>
         </p:spPr>
@@ -4383,7 +4383,7 @@
           </a:ln>
           <a:extLst>
             <a:ext uri="{C572A759-6A51-4108-AA02-DFA0A04FC94B}">
-              <ma14:wrappingTextBoxFlag xmlns:ma14="http://schemas.microsoft.com/office/mac/drawingml/2011/main" xmlns:a14="http://schemas.microsoft.com/office/drawing/2010/main" xmlns:m="http://schemas.openxmlformats.org/officeDocument/2006/math" xmlns="" val="1"/>
+              <ma14:wrappingTextBoxFlag xmlns="" xmlns:m="http://schemas.openxmlformats.org/officeDocument/2006/math" xmlns:a14="http://schemas.microsoft.com/office/drawing/2010/main" xmlns:ma14="http://schemas.microsoft.com/office/mac/drawingml/2011/main" val="1"/>
             </a:ext>
           </a:extLst>
         </p:spPr>
@@ -4443,7 +4443,7 @@
           </a:ln>
           <a:extLst>
             <a:ext uri="{C572A759-6A51-4108-AA02-DFA0A04FC94B}">
-              <ma14:wrappingTextBoxFlag xmlns:ma14="http://schemas.microsoft.com/office/mac/drawingml/2011/main" xmlns:a14="http://schemas.microsoft.com/office/drawing/2010/main" xmlns:m="http://schemas.openxmlformats.org/officeDocument/2006/math" xmlns="" val="1"/>
+              <ma14:wrappingTextBoxFlag xmlns="" xmlns:m="http://schemas.openxmlformats.org/officeDocument/2006/math" xmlns:a14="http://schemas.microsoft.com/office/drawing/2010/main" xmlns:ma14="http://schemas.microsoft.com/office/mac/drawingml/2011/main" val="1"/>
             </a:ext>
           </a:extLst>
         </p:spPr>
@@ -4656,7 +4656,7 @@
           </a:ln>
           <a:extLst>
             <a:ext uri="{C572A759-6A51-4108-AA02-DFA0A04FC94B}">
-              <ma14:wrappingTextBoxFlag xmlns:ma14="http://schemas.microsoft.com/office/mac/drawingml/2011/main" xmlns:a14="http://schemas.microsoft.com/office/drawing/2010/main" xmlns:m="http://schemas.openxmlformats.org/officeDocument/2006/math" xmlns="" val="1"/>
+              <ma14:wrappingTextBoxFlag xmlns="" xmlns:m="http://schemas.openxmlformats.org/officeDocument/2006/math" xmlns:a14="http://schemas.microsoft.com/office/drawing/2010/main" xmlns:ma14="http://schemas.microsoft.com/office/mac/drawingml/2011/main" val="1"/>
             </a:ext>
           </a:extLst>
         </p:spPr>
@@ -4856,7 +4856,7 @@
           </a:ln>
           <a:extLst>
             <a:ext uri="{C572A759-6A51-4108-AA02-DFA0A04FC94B}">
-              <ma14:wrappingTextBoxFlag xmlns:ma14="http://schemas.microsoft.com/office/mac/drawingml/2011/main" xmlns:a14="http://schemas.microsoft.com/office/drawing/2010/main" xmlns:m="http://schemas.openxmlformats.org/officeDocument/2006/math" xmlns="" val="1"/>
+              <ma14:wrappingTextBoxFlag xmlns="" xmlns:m="http://schemas.openxmlformats.org/officeDocument/2006/math" xmlns:a14="http://schemas.microsoft.com/office/drawing/2010/main" xmlns:ma14="http://schemas.microsoft.com/office/mac/drawingml/2011/main" val="1"/>
             </a:ext>
           </a:extLst>
         </p:spPr>
@@ -4955,7 +4955,7 @@
           </a:ln>
           <a:extLst>
             <a:ext uri="{C572A759-6A51-4108-AA02-DFA0A04FC94B}">
-              <ma14:wrappingTextBoxFlag xmlns:ma14="http://schemas.microsoft.com/office/mac/drawingml/2011/main" xmlns:a14="http://schemas.microsoft.com/office/drawing/2010/main" xmlns:m="http://schemas.openxmlformats.org/officeDocument/2006/math" xmlns="" val="1"/>
+              <ma14:wrappingTextBoxFlag xmlns="" xmlns:m="http://schemas.openxmlformats.org/officeDocument/2006/math" xmlns:a14="http://schemas.microsoft.com/office/drawing/2010/main" xmlns:ma14="http://schemas.microsoft.com/office/mac/drawingml/2011/main" val="1"/>
             </a:ext>
           </a:extLst>
         </p:spPr>
@@ -6017,7 +6017,7 @@
           </a:ln>
           <a:extLst>
             <a:ext uri="{C572A759-6A51-4108-AA02-DFA0A04FC94B}">
-              <ma14:wrappingTextBoxFlag xmlns:ma14="http://schemas.microsoft.com/office/mac/drawingml/2011/main" xmlns:a14="http://schemas.microsoft.com/office/drawing/2010/main" xmlns:m="http://schemas.openxmlformats.org/officeDocument/2006/math" xmlns="" val="1"/>
+              <ma14:wrappingTextBoxFlag xmlns="" xmlns:m="http://schemas.openxmlformats.org/officeDocument/2006/math" xmlns:a14="http://schemas.microsoft.com/office/drawing/2010/main" xmlns:ma14="http://schemas.microsoft.com/office/mac/drawingml/2011/main" val="1"/>
             </a:ext>
           </a:extLst>
         </p:spPr>
@@ -6274,7 +6274,7 @@
           </a:ln>
           <a:extLst>
             <a:ext uri="{C572A759-6A51-4108-AA02-DFA0A04FC94B}">
-              <ma14:wrappingTextBoxFlag xmlns:ma14="http://schemas.microsoft.com/office/mac/drawingml/2011/main" xmlns:a14="http://schemas.microsoft.com/office/drawing/2010/main" xmlns:m="http://schemas.openxmlformats.org/officeDocument/2006/math" xmlns="" val="1"/>
+              <ma14:wrappingTextBoxFlag xmlns="" xmlns:m="http://schemas.openxmlformats.org/officeDocument/2006/math" xmlns:a14="http://schemas.microsoft.com/office/drawing/2010/main" xmlns:ma14="http://schemas.microsoft.com/office/mac/drawingml/2011/main" val="1"/>
             </a:ext>
           </a:extLst>
         </p:spPr>
@@ -6380,7 +6380,7 @@
           </a:ln>
           <a:extLst>
             <a:ext uri="{C572A759-6A51-4108-AA02-DFA0A04FC94B}">
-              <ma14:wrappingTextBoxFlag xmlns:ma14="http://schemas.microsoft.com/office/mac/drawingml/2011/main" xmlns:a14="http://schemas.microsoft.com/office/drawing/2010/main" xmlns:m="http://schemas.openxmlformats.org/officeDocument/2006/math" xmlns="" val="1"/>
+              <ma14:wrappingTextBoxFlag xmlns="" xmlns:m="http://schemas.openxmlformats.org/officeDocument/2006/math" xmlns:a14="http://schemas.microsoft.com/office/drawing/2010/main" xmlns:ma14="http://schemas.microsoft.com/office/mac/drawingml/2011/main" val="1"/>
             </a:ext>
           </a:extLst>
         </p:spPr>
@@ -6544,7 +6544,7 @@
           </a:ln>
           <a:extLst>
             <a:ext uri="{C572A759-6A51-4108-AA02-DFA0A04FC94B}">
-              <ma14:wrappingTextBoxFlag xmlns:ma14="http://schemas.microsoft.com/office/mac/drawingml/2011/main" xmlns:a14="http://schemas.microsoft.com/office/drawing/2010/main" xmlns:m="http://schemas.openxmlformats.org/officeDocument/2006/math" xmlns="" val="1"/>
+              <ma14:wrappingTextBoxFlag xmlns="" xmlns:m="http://schemas.openxmlformats.org/officeDocument/2006/math" xmlns:a14="http://schemas.microsoft.com/office/drawing/2010/main" xmlns:ma14="http://schemas.microsoft.com/office/mac/drawingml/2011/main" val="1"/>
             </a:ext>
           </a:extLst>
         </p:spPr>
@@ -6900,7 +6900,7 @@
           </a:ln>
           <a:extLst>
             <a:ext uri="{C572A759-6A51-4108-AA02-DFA0A04FC94B}">
-              <ma14:wrappingTextBoxFlag xmlns:ma14="http://schemas.microsoft.com/office/mac/drawingml/2011/main" xmlns:a14="http://schemas.microsoft.com/office/drawing/2010/main" xmlns:m="http://schemas.openxmlformats.org/officeDocument/2006/math" xmlns="" val="1"/>
+              <ma14:wrappingTextBoxFlag xmlns="" xmlns:m="http://schemas.openxmlformats.org/officeDocument/2006/math" xmlns:a14="http://schemas.microsoft.com/office/drawing/2010/main" xmlns:ma14="http://schemas.microsoft.com/office/mac/drawingml/2011/main" val="1"/>
             </a:ext>
           </a:extLst>
         </p:spPr>
@@ -7208,7 +7208,7 @@
           </a:ln>
           <a:extLst>
             <a:ext uri="{C572A759-6A51-4108-AA02-DFA0A04FC94B}">
-              <ma14:wrappingTextBoxFlag xmlns:ma14="http://schemas.microsoft.com/office/mac/drawingml/2011/main" xmlns:a14="http://schemas.microsoft.com/office/drawing/2010/main" xmlns:m="http://schemas.openxmlformats.org/officeDocument/2006/math" xmlns="" val="1"/>
+              <ma14:wrappingTextBoxFlag xmlns="" xmlns:m="http://schemas.openxmlformats.org/officeDocument/2006/math" xmlns:a14="http://schemas.microsoft.com/office/drawing/2010/main" xmlns:ma14="http://schemas.microsoft.com/office/mac/drawingml/2011/main" val="1"/>
             </a:ext>
           </a:extLst>
         </p:spPr>
@@ -7462,7 +7462,7 @@
           </a:ln>
           <a:extLst>
             <a:ext uri="{C572A759-6A51-4108-AA02-DFA0A04FC94B}">
-              <ma14:wrappingTextBoxFlag xmlns:ma14="http://schemas.microsoft.com/office/mac/drawingml/2011/main" xmlns:a14="http://schemas.microsoft.com/office/drawing/2010/main" xmlns:m="http://schemas.openxmlformats.org/officeDocument/2006/math" xmlns="" val="1"/>
+              <ma14:wrappingTextBoxFlag xmlns="" xmlns:m="http://schemas.openxmlformats.org/officeDocument/2006/math" xmlns:a14="http://schemas.microsoft.com/office/drawing/2010/main" xmlns:ma14="http://schemas.microsoft.com/office/mac/drawingml/2011/main" val="1"/>
             </a:ext>
           </a:extLst>
         </p:spPr>
@@ -7598,7 +7598,7 @@
           </a:ln>
           <a:extLst>
             <a:ext uri="{C572A759-6A51-4108-AA02-DFA0A04FC94B}">
-              <ma14:wrappingTextBoxFlag xmlns:ma14="http://schemas.microsoft.com/office/mac/drawingml/2011/main" xmlns:a14="http://schemas.microsoft.com/office/drawing/2010/main" xmlns:m="http://schemas.openxmlformats.org/officeDocument/2006/math" xmlns="" val="1"/>
+              <ma14:wrappingTextBoxFlag xmlns="" xmlns:m="http://schemas.openxmlformats.org/officeDocument/2006/math" xmlns:a14="http://schemas.microsoft.com/office/drawing/2010/main" xmlns:ma14="http://schemas.microsoft.com/office/mac/drawingml/2011/main" val="1"/>
             </a:ext>
           </a:extLst>
         </p:spPr>
@@ -7756,7 +7756,7 @@
           </a:ln>
           <a:extLst>
             <a:ext uri="{C572A759-6A51-4108-AA02-DFA0A04FC94B}">
-              <ma14:wrappingTextBoxFlag xmlns:ma14="http://schemas.microsoft.com/office/mac/drawingml/2011/main" xmlns:a14="http://schemas.microsoft.com/office/drawing/2010/main" xmlns:m="http://schemas.openxmlformats.org/officeDocument/2006/math" xmlns="" val="1"/>
+              <ma14:wrappingTextBoxFlag xmlns="" xmlns:m="http://schemas.openxmlformats.org/officeDocument/2006/math" xmlns:a14="http://schemas.microsoft.com/office/drawing/2010/main" xmlns:ma14="http://schemas.microsoft.com/office/mac/drawingml/2011/main" val="1"/>
             </a:ext>
           </a:extLst>
         </p:spPr>
@@ -7923,7 +7923,7 @@
           </a:ln>
           <a:extLst>
             <a:ext uri="{C572A759-6A51-4108-AA02-DFA0A04FC94B}">
-              <ma14:wrappingTextBoxFlag xmlns:ma14="http://schemas.microsoft.com/office/mac/drawingml/2011/main" xmlns:a14="http://schemas.microsoft.com/office/drawing/2010/main" xmlns:m="http://schemas.openxmlformats.org/officeDocument/2006/math" xmlns="" val="1"/>
+              <ma14:wrappingTextBoxFlag xmlns="" xmlns:m="http://schemas.openxmlformats.org/officeDocument/2006/math" xmlns:a14="http://schemas.microsoft.com/office/drawing/2010/main" xmlns:ma14="http://schemas.microsoft.com/office/mac/drawingml/2011/main" val="1"/>
             </a:ext>
           </a:extLst>
         </p:spPr>
@@ -8478,7 +8478,7 @@
         <p:spPr>
           <a:xfrm>
             <a:off x="4417307" y="4680525"/>
-            <a:ext cx="2023860" cy="417982"/>
+            <a:ext cx="2230854" cy="417982"/>
           </a:xfrm>
           <a:prstGeom prst="rect">
             <a:avLst/>
@@ -8494,7 +8494,7 @@
           </a:ln>
           <a:extLst>
             <a:ext uri="{C572A759-6A51-4108-AA02-DFA0A04FC94B}">
-              <ma14:wrappingTextBoxFlag xmlns:ma14="http://schemas.microsoft.com/office/mac/drawingml/2011/main" xmlns:a14="http://schemas.microsoft.com/office/drawing/2010/main" xmlns:m="http://schemas.openxmlformats.org/officeDocument/2006/math" xmlns="" val="1"/>
+              <ma14:wrappingTextBoxFlag xmlns="" xmlns:m="http://schemas.openxmlformats.org/officeDocument/2006/math" xmlns:a14="http://schemas.microsoft.com/office/drawing/2010/main" xmlns:ma14="http://schemas.microsoft.com/office/mac/drawingml/2011/main" val="1"/>
             </a:ext>
           </a:extLst>
         </p:spPr>
@@ -8534,7 +8534,7 @@
               <a:rPr lang="fr-FR" sz="1000" b="0" dirty="0">
                 <a:sym typeface="Menlo"/>
               </a:rPr>
-              <a:t> = "item1")</a:t>
+              <a:t> = "item1", ...)</a:t>
             </a:r>
           </a:p>
         </p:txBody>
@@ -9042,8 +9042,8 @@
         </p:nvSpPr>
         <p:spPr>
           <a:xfrm>
-            <a:off x="4390325" y="6104876"/>
-            <a:ext cx="2023860" cy="417982"/>
+            <a:off x="4390324" y="6104876"/>
+            <a:ext cx="2330473" cy="417982"/>
           </a:xfrm>
           <a:prstGeom prst="rect">
             <a:avLst/>
@@ -9059,7 +9059,7 @@
           </a:ln>
           <a:extLst>
             <a:ext uri="{C572A759-6A51-4108-AA02-DFA0A04FC94B}">
-              <ma14:wrappingTextBoxFlag xmlns:ma14="http://schemas.microsoft.com/office/mac/drawingml/2011/main" xmlns:a14="http://schemas.microsoft.com/office/drawing/2010/main" xmlns:m="http://schemas.openxmlformats.org/officeDocument/2006/math" xmlns="" val="1"/>
+              <ma14:wrappingTextBoxFlag xmlns="" xmlns:m="http://schemas.openxmlformats.org/officeDocument/2006/math" xmlns:a14="http://schemas.microsoft.com/office/drawing/2010/main" xmlns:ma14="http://schemas.microsoft.com/office/mac/drawingml/2011/main" val="1"/>
             </a:ext>
           </a:extLst>
         </p:spPr>
@@ -9087,19 +9087,31 @@
               <a:rPr lang="fr-FR" sz="1000" b="0" dirty="0">
                 <a:sym typeface="Menlo"/>
               </a:rPr>
-              <a:t>bs4SidebarMenuItem("Item ", </a:t>
+              <a:t>bs4SidebarMenuSubItem(</a:t>
             </a:r>
             <a:r>
               <a:rPr lang="fr-FR" sz="1000" b="0" dirty="0" err="1">
                 <a:sym typeface="Menlo"/>
               </a:rPr>
-              <a:t>tabName</a:t>
+              <a:t>text</a:t>
             </a:r>
             <a:r>
               <a:rPr lang="fr-FR" sz="1000" b="0" dirty="0">
                 <a:sym typeface="Menlo"/>
               </a:rPr>
-              <a:t> = "item", ...)</a:t>
+              <a:t> = "Item ", </a:t>
+            </a:r>
+            <a:r>
+              <a:rPr lang="fr-FR" sz="1000" b="0" dirty="0" err="1">
+                <a:sym typeface="Menlo"/>
+              </a:rPr>
+              <a:t>tabName</a:t>
+            </a:r>
+            <a:r>
+              <a:rPr lang="fr-FR" sz="1000" b="0" dirty="0">
+                <a:sym typeface="Menlo"/>
+              </a:rPr>
+              <a:t> = "item")</a:t>
             </a:r>
           </a:p>
         </p:txBody>
@@ -9449,8 +9461,8 @@
         </p:nvSpPr>
         <p:spPr>
           <a:xfrm>
-            <a:off x="4404675" y="4667188"/>
-            <a:ext cx="2049124" cy="422255"/>
+            <a:off x="4398081" y="4683100"/>
+            <a:ext cx="2250079" cy="422255"/>
           </a:xfrm>
           <a:prstGeom prst="rect">
             <a:avLst/>
@@ -9631,8 +9643,8 @@
         </p:nvSpPr>
         <p:spPr>
           <a:xfrm>
-            <a:off x="4398082" y="6110174"/>
-            <a:ext cx="2049037" cy="408763"/>
+            <a:off x="4390323" y="6112704"/>
+            <a:ext cx="2330471" cy="408763"/>
           </a:xfrm>
           <a:prstGeom prst="rect">
             <a:avLst/>
@@ -9691,7 +9703,7 @@
               <a:buNone/>
               <a:tabLst/>
             </a:pPr>
-            <a:endParaRPr kumimoji="0" lang="fr-FR" sz="1200" b="0" i="0" u="none" strike="noStrike" cap="none" spc="0" normalizeH="0" baseline="0">
+            <a:endParaRPr kumimoji="0" lang="fr-FR" sz="1200" b="0" i="0" u="none" strike="noStrike" cap="none" spc="0" normalizeH="0" baseline="0" dirty="0">
               <a:ln>
                 <a:noFill/>
               </a:ln>
@@ -9739,7 +9751,7 @@
           </a:ln>
           <a:extLst>
             <a:ext uri="{C572A759-6A51-4108-AA02-DFA0A04FC94B}">
-              <ma14:wrappingTextBoxFlag xmlns:ma14="http://schemas.microsoft.com/office/mac/drawingml/2011/main" xmlns:a14="http://schemas.microsoft.com/office/drawing/2010/main" xmlns:m="http://schemas.openxmlformats.org/officeDocument/2006/math" xmlns="" val="1"/>
+              <ma14:wrappingTextBoxFlag xmlns="" xmlns:m="http://schemas.openxmlformats.org/officeDocument/2006/math" xmlns:a14="http://schemas.microsoft.com/office/drawing/2010/main" xmlns:ma14="http://schemas.microsoft.com/office/mac/drawingml/2011/main" val="1"/>
             </a:ext>
           </a:extLst>
         </p:spPr>
@@ -9803,7 +9815,7 @@
           </a:ln>
           <a:extLst>
             <a:ext uri="{C572A759-6A51-4108-AA02-DFA0A04FC94B}">
-              <ma14:wrappingTextBoxFlag xmlns:ma14="http://schemas.microsoft.com/office/mac/drawingml/2011/main" xmlns:a14="http://schemas.microsoft.com/office/drawing/2010/main" xmlns:m="http://schemas.openxmlformats.org/officeDocument/2006/math" xmlns="" val="1"/>
+              <ma14:wrappingTextBoxFlag xmlns="" xmlns:m="http://schemas.openxmlformats.org/officeDocument/2006/math" xmlns:a14="http://schemas.microsoft.com/office/drawing/2010/main" xmlns:ma14="http://schemas.microsoft.com/office/mac/drawingml/2011/main" val="1"/>
             </a:ext>
           </a:extLst>
         </p:spPr>
@@ -9867,7 +9879,7 @@
           </a:ln>
           <a:extLst>
             <a:ext uri="{C572A759-6A51-4108-AA02-DFA0A04FC94B}">
-              <ma14:wrappingTextBoxFlag xmlns:ma14="http://schemas.microsoft.com/office/mac/drawingml/2011/main" xmlns:a14="http://schemas.microsoft.com/office/drawing/2010/main" xmlns:m="http://schemas.openxmlformats.org/officeDocument/2006/math" xmlns="" val="1"/>
+              <ma14:wrappingTextBoxFlag xmlns="" xmlns:m="http://schemas.openxmlformats.org/officeDocument/2006/math" xmlns:a14="http://schemas.microsoft.com/office/drawing/2010/main" xmlns:ma14="http://schemas.microsoft.com/office/mac/drawingml/2011/main" val="1"/>
             </a:ext>
           </a:extLst>
         </p:spPr>
@@ -12114,7 +12126,7 @@
           </a:ln>
           <a:extLst>
             <a:ext uri="{C572A759-6A51-4108-AA02-DFA0A04FC94B}">
-              <ma14:wrappingTextBoxFlag xmlns:ma14="http://schemas.microsoft.com/office/mac/drawingml/2011/main" xmlns:a14="http://schemas.microsoft.com/office/drawing/2010/main" xmlns:m="http://schemas.openxmlformats.org/officeDocument/2006/math" xmlns="" val="1"/>
+              <ma14:wrappingTextBoxFlag xmlns="" xmlns:m="http://schemas.openxmlformats.org/officeDocument/2006/math" xmlns:a14="http://schemas.microsoft.com/office/drawing/2010/main" xmlns:ma14="http://schemas.microsoft.com/office/mac/drawingml/2011/main" val="1"/>
             </a:ext>
           </a:extLst>
         </p:spPr>
@@ -12322,7 +12334,7 @@
           </a:ln>
           <a:extLst>
             <a:ext uri="{C572A759-6A51-4108-AA02-DFA0A04FC94B}">
-              <ma14:wrappingTextBoxFlag xmlns:ma14="http://schemas.microsoft.com/office/mac/drawingml/2011/main" xmlns:a14="http://schemas.microsoft.com/office/drawing/2010/main" xmlns:m="http://schemas.openxmlformats.org/officeDocument/2006/math" xmlns="" val="1"/>
+              <ma14:wrappingTextBoxFlag xmlns="" xmlns:m="http://schemas.openxmlformats.org/officeDocument/2006/math" xmlns:a14="http://schemas.microsoft.com/office/drawing/2010/main" xmlns:ma14="http://schemas.microsoft.com/office/mac/drawingml/2011/main" val="1"/>
             </a:ext>
           </a:extLst>
         </p:spPr>
@@ -12440,7 +12452,7 @@
           </a:ln>
           <a:extLst>
             <a:ext uri="{C572A759-6A51-4108-AA02-DFA0A04FC94B}">
-              <ma14:wrappingTextBoxFlag xmlns:ma14="http://schemas.microsoft.com/office/mac/drawingml/2011/main" xmlns:a14="http://schemas.microsoft.com/office/drawing/2010/main" xmlns:m="http://schemas.openxmlformats.org/officeDocument/2006/math" xmlns="" val="1"/>
+              <ma14:wrappingTextBoxFlag xmlns="" xmlns:m="http://schemas.openxmlformats.org/officeDocument/2006/math" xmlns:a14="http://schemas.microsoft.com/office/drawing/2010/main" xmlns:ma14="http://schemas.microsoft.com/office/mac/drawingml/2011/main" val="1"/>
             </a:ext>
           </a:extLst>
         </p:spPr>
@@ -12579,7 +12591,7 @@
           </a:ln>
           <a:extLst>
             <a:ext uri="{C572A759-6A51-4108-AA02-DFA0A04FC94B}">
-              <ma14:wrappingTextBoxFlag xmlns:ma14="http://schemas.microsoft.com/office/mac/drawingml/2011/main" xmlns:a14="http://schemas.microsoft.com/office/drawing/2010/main" xmlns:m="http://schemas.openxmlformats.org/officeDocument/2006/math" xmlns="" val="1"/>
+              <ma14:wrappingTextBoxFlag xmlns="" xmlns:m="http://schemas.openxmlformats.org/officeDocument/2006/math" xmlns:a14="http://schemas.microsoft.com/office/drawing/2010/main" xmlns:ma14="http://schemas.microsoft.com/office/mac/drawingml/2011/main" val="1"/>
             </a:ext>
           </a:extLst>
         </p:spPr>
@@ -12687,7 +12699,7 @@
           </a:ln>
           <a:extLst>
             <a:ext uri="{C572A759-6A51-4108-AA02-DFA0A04FC94B}">
-              <ma14:wrappingTextBoxFlag xmlns:ma14="http://schemas.microsoft.com/office/mac/drawingml/2011/main" xmlns:a14="http://schemas.microsoft.com/office/drawing/2010/main" xmlns:m="http://schemas.openxmlformats.org/officeDocument/2006/math" xmlns="" val="1"/>
+              <ma14:wrappingTextBoxFlag xmlns="" xmlns:m="http://schemas.openxmlformats.org/officeDocument/2006/math" xmlns:a14="http://schemas.microsoft.com/office/drawing/2010/main" xmlns:ma14="http://schemas.microsoft.com/office/mac/drawingml/2011/main" val="1"/>
             </a:ext>
           </a:extLst>
         </p:spPr>
@@ -12803,7 +12815,7 @@
           </a:ln>
           <a:extLst>
             <a:ext uri="{C572A759-6A51-4108-AA02-DFA0A04FC94B}">
-              <ma14:wrappingTextBoxFlag xmlns:ma14="http://schemas.microsoft.com/office/mac/drawingml/2011/main" xmlns:a14="http://schemas.microsoft.com/office/drawing/2010/main" xmlns:m="http://schemas.openxmlformats.org/officeDocument/2006/math" xmlns="" val="1"/>
+              <ma14:wrappingTextBoxFlag xmlns="" xmlns:m="http://schemas.openxmlformats.org/officeDocument/2006/math" xmlns:a14="http://schemas.microsoft.com/office/drawing/2010/main" xmlns:ma14="http://schemas.microsoft.com/office/mac/drawingml/2011/main" val="1"/>
             </a:ext>
           </a:extLst>
         </p:spPr>
@@ -13154,7 +13166,7 @@
           </a:ln>
           <a:extLst>
             <a:ext uri="{C572A759-6A51-4108-AA02-DFA0A04FC94B}">
-              <ma14:wrappingTextBoxFlag xmlns:ma14="http://schemas.microsoft.com/office/mac/drawingml/2011/main" xmlns:a14="http://schemas.microsoft.com/office/drawing/2010/main" xmlns:m="http://schemas.openxmlformats.org/officeDocument/2006/math" xmlns="" val="1"/>
+              <ma14:wrappingTextBoxFlag xmlns="" xmlns:m="http://schemas.openxmlformats.org/officeDocument/2006/math" xmlns:a14="http://schemas.microsoft.com/office/drawing/2010/main" xmlns:ma14="http://schemas.microsoft.com/office/mac/drawingml/2011/main" val="1"/>
             </a:ext>
           </a:extLst>
         </p:spPr>
@@ -13936,7 +13948,7 @@
           </a:ln>
           <a:extLst>
             <a:ext uri="{C572A759-6A51-4108-AA02-DFA0A04FC94B}">
-              <ma14:wrappingTextBoxFlag xmlns:ma14="http://schemas.microsoft.com/office/mac/drawingml/2011/main" xmlns:a14="http://schemas.microsoft.com/office/drawing/2010/main" xmlns:m="http://schemas.openxmlformats.org/officeDocument/2006/math" xmlns="" val="1"/>
+              <ma14:wrappingTextBoxFlag xmlns="" xmlns:m="http://schemas.openxmlformats.org/officeDocument/2006/math" xmlns:a14="http://schemas.microsoft.com/office/drawing/2010/main" xmlns:ma14="http://schemas.microsoft.com/office/mac/drawingml/2011/main" val="1"/>
             </a:ext>
           </a:extLst>
         </p:spPr>
@@ -14602,7 +14614,7 @@
           </a:ln>
           <a:extLst>
             <a:ext uri="{C572A759-6A51-4108-AA02-DFA0A04FC94B}">
-              <ma14:wrappingTextBoxFlag xmlns:ma14="http://schemas.microsoft.com/office/mac/drawingml/2011/main" xmlns:a14="http://schemas.microsoft.com/office/drawing/2010/main" xmlns:m="http://schemas.openxmlformats.org/officeDocument/2006/math" xmlns="" val="1"/>
+              <ma14:wrappingTextBoxFlag xmlns="" xmlns:m="http://schemas.openxmlformats.org/officeDocument/2006/math" xmlns:a14="http://schemas.microsoft.com/office/drawing/2010/main" xmlns:ma14="http://schemas.microsoft.com/office/mac/drawingml/2011/main" val="1"/>
             </a:ext>
           </a:extLst>
         </p:spPr>
@@ -14868,7 +14880,7 @@
           </a:ln>
           <a:extLst>
             <a:ext uri="{C572A759-6A51-4108-AA02-DFA0A04FC94B}">
-              <ma14:wrappingTextBoxFlag xmlns:ma14="http://schemas.microsoft.com/office/mac/drawingml/2011/main" xmlns:a14="http://schemas.microsoft.com/office/drawing/2010/main" xmlns:m="http://schemas.openxmlformats.org/officeDocument/2006/math" xmlns="" val="1"/>
+              <ma14:wrappingTextBoxFlag xmlns="" xmlns:m="http://schemas.openxmlformats.org/officeDocument/2006/math" xmlns:a14="http://schemas.microsoft.com/office/drawing/2010/main" xmlns:ma14="http://schemas.microsoft.com/office/mac/drawingml/2011/main" val="1"/>
             </a:ext>
           </a:extLst>
         </p:spPr>
@@ -14930,7 +14942,7 @@
           </a:ln>
           <a:extLst>
             <a:ext uri="{C572A759-6A51-4108-AA02-DFA0A04FC94B}">
-              <ma14:wrappingTextBoxFlag xmlns:ma14="http://schemas.microsoft.com/office/mac/drawingml/2011/main" xmlns:a14="http://schemas.microsoft.com/office/drawing/2010/main" xmlns:m="http://schemas.openxmlformats.org/officeDocument/2006/math" xmlns="" val="1"/>
+              <ma14:wrappingTextBoxFlag xmlns="" xmlns:m="http://schemas.openxmlformats.org/officeDocument/2006/math" xmlns:a14="http://schemas.microsoft.com/office/drawing/2010/main" xmlns:ma14="http://schemas.microsoft.com/office/mac/drawingml/2011/main" val="1"/>
             </a:ext>
           </a:extLst>
         </p:spPr>
@@ -15062,7 +15074,7 @@
           </a:ln>
           <a:extLst>
             <a:ext uri="{C572A759-6A51-4108-AA02-DFA0A04FC94B}">
-              <ma14:wrappingTextBoxFlag xmlns:ma14="http://schemas.microsoft.com/office/mac/drawingml/2011/main" xmlns:a14="http://schemas.microsoft.com/office/drawing/2010/main" xmlns:m="http://schemas.openxmlformats.org/officeDocument/2006/math" xmlns="" val="1"/>
+              <ma14:wrappingTextBoxFlag xmlns="" xmlns:m="http://schemas.openxmlformats.org/officeDocument/2006/math" xmlns:a14="http://schemas.microsoft.com/office/drawing/2010/main" xmlns:ma14="http://schemas.microsoft.com/office/mac/drawingml/2011/main" val="1"/>
             </a:ext>
           </a:extLst>
         </p:spPr>
@@ -15197,7 +15209,7 @@
           </a:ln>
           <a:extLst>
             <a:ext uri="{C572A759-6A51-4108-AA02-DFA0A04FC94B}">
-              <ma14:wrappingTextBoxFlag xmlns:ma14="http://schemas.microsoft.com/office/mac/drawingml/2011/main" xmlns:a14="http://schemas.microsoft.com/office/drawing/2010/main" xmlns:m="http://schemas.openxmlformats.org/officeDocument/2006/math" xmlns="" val="1"/>
+              <ma14:wrappingTextBoxFlag xmlns="" xmlns:m="http://schemas.openxmlformats.org/officeDocument/2006/math" xmlns:a14="http://schemas.microsoft.com/office/drawing/2010/main" xmlns:ma14="http://schemas.microsoft.com/office/mac/drawingml/2011/main" val="1"/>
             </a:ext>
           </a:extLst>
         </p:spPr>

</xml_diff>